<commit_message>
added link in slideshow
</commit_message>
<xml_diff>
--- a/diapo/Génie Logiciel.pptx
+++ b/diapo/Génie Logiciel.pptx
@@ -5,7 +5,7 @@
     <p:sldMasterId id="2147483840" r:id="rId1"/>
   </p:sldMasterIdLst>
   <p:notesMasterIdLst>
-    <p:notesMasterId r:id="rId26"/>
+    <p:notesMasterId r:id="rId27"/>
   </p:notesMasterIdLst>
   <p:sldIdLst>
     <p:sldId id="256" r:id="rId2"/>
@@ -31,7 +31,8 @@
     <p:sldId id="272" r:id="rId22"/>
     <p:sldId id="278" r:id="rId23"/>
     <p:sldId id="277" r:id="rId24"/>
-    <p:sldId id="279" r:id="rId25"/>
+    <p:sldId id="280" r:id="rId25"/>
+    <p:sldId id="279" r:id="rId26"/>
   </p:sldIdLst>
   <p:sldSz cx="12192000" cy="6858000"/>
   <p:notesSz cx="6858000" cy="9144000"/>
@@ -130,6 +131,11 @@
       </a:defRPr>
     </a:lvl9pPr>
   </p:defaultTextStyle>
+  <p:extLst>
+    <p:ext uri="{EFAFB233-063F-42B5-8137-9DF3F51BA10A}">
+      <p15:sldGuideLst xmlns:p15="http://schemas.microsoft.com/office/powerpoint/2012/main"/>
+    </p:ext>
+  </p:extLst>
 </p:presentation>
 </file>
 
@@ -215,7 +221,7 @@
           <a:p>
             <a:fld id="{F4DDF8D2-4D5F-4E4E-90A2-506DFEBB338B}" type="datetimeFigureOut">
               <a:rPr lang="fr-FR" smtClean="0"/>
-              <a:t>06/12/2015</a:t>
+              <a:t>07/12/2015</a:t>
             </a:fld>
             <a:endParaRPr lang="fr-FR"/>
           </a:p>
@@ -651,7 +657,7 @@
           <a:p>
             <a:fld id="{381ADA88-0FFD-4AA1-BDCE-798AD4507A95}" type="datetime1">
               <a:rPr lang="en-US" smtClean="0"/>
-              <a:t>12/6/2015</a:t>
+              <a:t>12/7/2015</a:t>
             </a:fld>
             <a:endParaRPr lang="en-US" dirty="0"/>
           </a:p>
@@ -879,7 +885,7 @@
           <a:p>
             <a:fld id="{2974DE2F-503A-4F10-A4C9-9C020CC1C601}" type="datetime1">
               <a:rPr lang="en-US" smtClean="0"/>
-              <a:t>12/6/2015</a:t>
+              <a:t>12/7/2015</a:t>
             </a:fld>
             <a:endParaRPr lang="en-US" dirty="0"/>
           </a:p>
@@ -1058,7 +1064,7 @@
           <a:p>
             <a:fld id="{38B1A317-74E0-4B59-B579-3A14C50A5964}" type="datetime1">
               <a:rPr lang="en-US" smtClean="0"/>
-              <a:t>12/6/2015</a:t>
+              <a:t>12/7/2015</a:t>
             </a:fld>
             <a:endParaRPr lang="en-US" dirty="0"/>
           </a:p>
@@ -1227,7 +1233,7 @@
           <a:p>
             <a:fld id="{11875C1E-403A-4643-BD13-D7F6FB25B36D}" type="datetime1">
               <a:rPr lang="en-US" smtClean="0"/>
-              <a:t>12/6/2015</a:t>
+              <a:t>12/7/2015</a:t>
             </a:fld>
             <a:endParaRPr lang="en-US" dirty="0"/>
           </a:p>
@@ -1480,7 +1486,7 @@
           <a:p>
             <a:fld id="{3B66C6DA-5376-4A85-80C4-8D246BDD0899}" type="datetime1">
               <a:rPr lang="en-US" smtClean="0"/>
-              <a:t>12/6/2015</a:t>
+              <a:t>12/7/2015</a:t>
             </a:fld>
             <a:endParaRPr lang="en-US" dirty="0"/>
           </a:p>
@@ -1805,7 +1811,7 @@
           <a:p>
             <a:fld id="{61B2C193-823D-4B65-97D9-2932F1FA0169}" type="datetime1">
               <a:rPr lang="en-US" smtClean="0"/>
-              <a:t>12/6/2015</a:t>
+              <a:t>12/7/2015</a:t>
             </a:fld>
             <a:endParaRPr lang="en-US" dirty="0"/>
           </a:p>
@@ -2255,7 +2261,7 @@
           <a:p>
             <a:fld id="{C9446164-3156-4606-B61A-F23754E1E783}" type="datetime1">
               <a:rPr lang="en-US" smtClean="0"/>
-              <a:t>12/6/2015</a:t>
+              <a:t>12/7/2015</a:t>
             </a:fld>
             <a:endParaRPr lang="en-US" dirty="0"/>
           </a:p>
@@ -2372,7 +2378,7 @@
           <a:p>
             <a:fld id="{A9E9C2C7-E7ED-4303-90C9-FAD480243283}" type="datetime1">
               <a:rPr lang="en-US" smtClean="0"/>
-              <a:t>12/6/2015</a:t>
+              <a:t>12/7/2015</a:t>
             </a:fld>
             <a:endParaRPr lang="en-US" dirty="0"/>
           </a:p>
@@ -2466,7 +2472,7 @@
           <a:p>
             <a:fld id="{D1F2129A-8A33-47DE-BDF9-678D2595840A}" type="datetime1">
               <a:rPr lang="en-US" smtClean="0"/>
-              <a:t>12/6/2015</a:t>
+              <a:t>12/7/2015</a:t>
             </a:fld>
             <a:endParaRPr lang="en-US" dirty="0"/>
           </a:p>
@@ -2752,7 +2758,7 @@
           <a:p>
             <a:fld id="{23E00780-4A26-4A72-B9E0-581CBC438B95}" type="datetime1">
               <a:rPr lang="en-US" smtClean="0"/>
-              <a:t>12/6/2015</a:t>
+              <a:t>12/7/2015</a:t>
             </a:fld>
             <a:endParaRPr lang="en-US" dirty="0"/>
           </a:p>
@@ -3076,7 +3082,7 @@
           <a:p>
             <a:fld id="{89205000-817D-4E23-8F69-0E1E78B16377}" type="datetime1">
               <a:rPr lang="en-US" smtClean="0"/>
-              <a:t>12/6/2015</a:t>
+              <a:t>12/7/2015</a:t>
             </a:fld>
             <a:endParaRPr lang="en-US" dirty="0"/>
           </a:p>
@@ -3329,7 +3335,7 @@
           <a:p>
             <a:fld id="{8D9E6D2A-0DE2-4490-824D-B537B4530840}" type="datetime1">
               <a:rPr lang="en-US" smtClean="0"/>
-              <a:t>12/6/2015</a:t>
+              <a:t>12/7/2015</a:t>
             </a:fld>
             <a:endParaRPr lang="en-US" dirty="0"/>
           </a:p>
@@ -4151,7 +4157,6 @@
               <a:rPr lang="fr-FR" dirty="0"/>
               <a:t>Projection de flux de réseaux sociaux</a:t>
             </a:r>
-            <a:endParaRPr lang="fr-FR" dirty="0"/>
           </a:p>
         </p:txBody>
       </p:sp>
@@ -14523,6 +14528,144 @@
             <p:ph type="title"/>
           </p:nvPr>
         </p:nvSpPr>
+        <p:spPr/>
+        <p:txBody>
+          <a:bodyPr/>
+          <a:lstStyle/>
+          <a:p>
+            <a:r>
+              <a:rPr lang="fr-FR" dirty="0" smtClean="0"/>
+              <a:t>Lien vers la maquette</a:t>
+            </a:r>
+            <a:endParaRPr lang="fr-FR" dirty="0"/>
+          </a:p>
+        </p:txBody>
+      </p:sp>
+      <p:sp>
+        <p:nvSpPr>
+          <p:cNvPr id="4" name="Espace réservé du pied de page 3"/>
+          <p:cNvSpPr>
+            <a:spLocks noGrp="1"/>
+          </p:cNvSpPr>
+          <p:nvPr>
+            <p:ph type="ftr" sz="quarter" idx="11"/>
+          </p:nvPr>
+        </p:nvSpPr>
+        <p:spPr/>
+        <p:txBody>
+          <a:bodyPr/>
+          <a:lstStyle/>
+          <a:p>
+            <a:r>
+              <a:rPr lang="fr-FR" smtClean="0"/>
+              <a:t>Génie Logiciel | Lundi 07 décembre</a:t>
+            </a:r>
+            <a:endParaRPr lang="en-US" dirty="0"/>
+          </a:p>
+        </p:txBody>
+      </p:sp>
+      <p:sp>
+        <p:nvSpPr>
+          <p:cNvPr id="5" name="Espace réservé du numéro de diapositive 4"/>
+          <p:cNvSpPr>
+            <a:spLocks noGrp="1"/>
+          </p:cNvSpPr>
+          <p:nvPr>
+            <p:ph type="sldNum" sz="quarter" idx="12"/>
+          </p:nvPr>
+        </p:nvSpPr>
+        <p:spPr/>
+        <p:txBody>
+          <a:bodyPr>
+            <a:normAutofit lnSpcReduction="10000"/>
+          </a:bodyPr>
+          <a:lstStyle/>
+          <a:p>
+            <a:fld id="{4FAB73BC-B049-4115-A692-8D63A059BFB8}" type="slidenum">
+              <a:rPr lang="en-US" smtClean="0"/>
+              <a:t>24</a:t>
+            </a:fld>
+            <a:endParaRPr lang="en-US" dirty="0"/>
+          </a:p>
+        </p:txBody>
+      </p:sp>
+      <p:sp>
+        <p:nvSpPr>
+          <p:cNvPr id="6" name="ZoneTexte 5"/>
+          <p:cNvSpPr txBox="1"/>
+          <p:nvPr/>
+        </p:nvSpPr>
+        <p:spPr>
+          <a:xfrm>
+            <a:off x="509451" y="3226526"/>
+            <a:ext cx="10580914" cy="1446550"/>
+          </a:xfrm>
+          <a:prstGeom prst="rect">
+            <a:avLst/>
+          </a:prstGeom>
+          <a:noFill/>
+        </p:spPr>
+        <p:txBody>
+          <a:bodyPr wrap="square" rtlCol="0">
+            <a:spAutoFit/>
+          </a:bodyPr>
+          <a:lstStyle/>
+          <a:p>
+            <a:pPr algn="ctr"/>
+            <a:r>
+              <a:rPr lang="fr-FR" sz="4400" dirty="0" smtClean="0">
+                <a:hlinkClick r:id="rId2"/>
+              </a:rPr>
+              <a:t>http://whispyy.github.com/MaquetteGL</a:t>
+            </a:r>
+            <a:endParaRPr lang="fr-FR" sz="4400" dirty="0" smtClean="0"/>
+          </a:p>
+          <a:p>
+            <a:pPr algn="ctr"/>
+            <a:endParaRPr lang="fr-FR" sz="4400" dirty="0" smtClean="0"/>
+          </a:p>
+        </p:txBody>
+      </p:sp>
+    </p:spTree>
+    <p:extLst>
+      <p:ext uri="{BB962C8B-B14F-4D97-AF65-F5344CB8AC3E}">
+        <p14:creationId xmlns:p14="http://schemas.microsoft.com/office/powerpoint/2010/main" val="5904043"/>
+      </p:ext>
+    </p:extLst>
+  </p:cSld>
+  <p:clrMapOvr>
+    <a:masterClrMapping/>
+  </p:clrMapOvr>
+</p:sld>
+</file>
+
+<file path=ppt/slides/slide25.xml><?xml version="1.0" encoding="utf-8"?>
+<p:sld xmlns:a="http://schemas.openxmlformats.org/drawingml/2006/main" xmlns:r="http://schemas.openxmlformats.org/officeDocument/2006/relationships" xmlns:p="http://schemas.openxmlformats.org/presentationml/2006/main">
+  <p:cSld>
+    <p:spTree>
+      <p:nvGrpSpPr>
+        <p:cNvPr id="1" name=""/>
+        <p:cNvGrpSpPr/>
+        <p:nvPr/>
+      </p:nvGrpSpPr>
+      <p:grpSpPr>
+        <a:xfrm>
+          <a:off x="0" y="0"/>
+          <a:ext cx="0" cy="0"/>
+          <a:chOff x="0" y="0"/>
+          <a:chExt cx="0" cy="0"/>
+        </a:xfrm>
+      </p:grpSpPr>
+      <p:sp>
+        <p:nvSpPr>
+          <p:cNvPr id="2" name="Titre 1"/>
+          <p:cNvSpPr>
+            <a:spLocks noGrp="1"/>
+          </p:cNvSpPr>
+          <p:nvPr>
+            <p:ph type="title"/>
+          </p:nvPr>
+        </p:nvSpPr>
         <p:spPr>
           <a:xfrm>
             <a:off x="0" y="2651760"/>
@@ -14586,7 +14729,7 @@
           <a:p>
             <a:fld id="{4FAB73BC-B049-4115-A692-8D63A059BFB8}" type="slidenum">
               <a:rPr lang="en-US" smtClean="0"/>
-              <a:t>24</a:t>
+              <a:t>25</a:t>
             </a:fld>
             <a:endParaRPr lang="en-US" dirty="0"/>
           </a:p>

</xml_diff>